<commit_message>
Added security, message expiration for pub-sub and moved XPath functionality from topic-level to session-level
</commit_message>
<xml_diff>
--- a/0-Doc/OpenO&M Information Service Bus Model Specification Diagrams.pptx
+++ b/0-Doc/OpenO&M Information Service Bus Model Specification Diagrams.pptx
@@ -6220,7 +6220,7 @@
         </p:nvSpPr>
         <p:spPr bwMode="auto">
           <a:xfrm>
-            <a:off x="5076280" y="2895600"/>
+            <a:off x="5076280" y="3411379"/>
             <a:ext cx="1721945" cy="246221"/>
           </a:xfrm>
           <a:prstGeom prst="rect">
@@ -6259,7 +6259,7 @@
         </p:nvSpPr>
         <p:spPr bwMode="auto">
           <a:xfrm flipH="1">
-            <a:off x="4794250" y="3090863"/>
+            <a:off x="4794250" y="3606642"/>
             <a:ext cx="2286000" cy="0"/>
           </a:xfrm>
           <a:prstGeom prst="line">
@@ -6329,7 +6329,7 @@
         </p:nvSpPr>
         <p:spPr bwMode="auto">
           <a:xfrm>
-            <a:off x="2051050" y="3505200"/>
+            <a:off x="2051050" y="3352800"/>
             <a:ext cx="2286000" cy="0"/>
           </a:xfrm>
           <a:prstGeom prst="line">
@@ -6363,7 +6363,7 @@
         </p:nvSpPr>
         <p:spPr bwMode="auto">
           <a:xfrm>
-            <a:off x="2623221" y="3276600"/>
+            <a:off x="2623221" y="3124200"/>
             <a:ext cx="1141659" cy="246221"/>
           </a:xfrm>
           <a:prstGeom prst="rect">
@@ -6398,42 +6398,7 @@
       </p:sp>
       <p:sp>
         <p:nvSpPr>
-          <p:cNvPr id="11281" name="Line 44"/>
-          <p:cNvSpPr>
-            <a:spLocks noChangeShapeType="1"/>
-          </p:cNvSpPr>
-          <p:nvPr/>
-        </p:nvSpPr>
-        <p:spPr bwMode="auto">
-          <a:xfrm>
-            <a:off x="4794250" y="3733800"/>
-            <a:ext cx="2286000" cy="0"/>
-          </a:xfrm>
-          <a:prstGeom prst="line">
-            <a:avLst/>
-          </a:prstGeom>
-          <a:noFill/>
-          <a:ln w="9525">
-            <a:solidFill>
-              <a:schemeClr val="tx1"/>
-            </a:solidFill>
-            <a:prstDash val="dash"/>
-            <a:round/>
-            <a:headEnd/>
-            <a:tailEnd type="triangle" w="med" len="med"/>
-          </a:ln>
-        </p:spPr>
-        <p:txBody>
-          <a:bodyPr/>
-          <a:lstStyle/>
-          <a:p>
-            <a:endParaRPr lang="en-US"/>
-          </a:p>
-        </p:txBody>
-      </p:sp>
-      <p:sp>
-        <p:nvSpPr>
-          <p:cNvPr id="11282" name="Text Box 45"/>
+          <p:cNvPr id="11296" name="Text Box 67"/>
           <p:cNvSpPr txBox="1">
             <a:spLocks noChangeArrowheads="1"/>
           </p:cNvSpPr>
@@ -6441,8 +6406,8 @@
         </p:nvSpPr>
         <p:spPr bwMode="auto">
           <a:xfrm>
-            <a:off x="5437188" y="3505200"/>
-            <a:ext cx="1000125" cy="246063"/>
+            <a:off x="5068267" y="6019800"/>
+            <a:ext cx="1737975" cy="246221"/>
           </a:xfrm>
           <a:prstGeom prst="rect">
             <a:avLst/>
@@ -6464,7 +6429,7 @@
             <a:pPr algn="ctr"/>
             <a:r>
               <a:rPr lang="en-US" sz="1000" b="0" dirty="0" smtClean="0"/>
-              <a:t>Notify Listener</a:t>
+              <a:t>Close Subscription Session</a:t>
             </a:r>
             <a:endParaRPr lang="en-US" sz="1000" b="0" dirty="0"/>
           </a:p>
@@ -6472,7 +6437,75 @@
       </p:sp>
       <p:sp>
         <p:nvSpPr>
-          <p:cNvPr id="11296" name="Text Box 67"/>
+          <p:cNvPr id="11297" name="Line 68"/>
+          <p:cNvSpPr>
+            <a:spLocks noChangeShapeType="1"/>
+          </p:cNvSpPr>
+          <p:nvPr/>
+        </p:nvSpPr>
+        <p:spPr bwMode="auto">
+          <a:xfrm flipH="1">
+            <a:off x="4794250" y="6248400"/>
+            <a:ext cx="2286000" cy="0"/>
+          </a:xfrm>
+          <a:prstGeom prst="line">
+            <a:avLst/>
+          </a:prstGeom>
+          <a:noFill/>
+          <a:ln w="9525">
+            <a:solidFill>
+              <a:schemeClr val="tx1"/>
+            </a:solidFill>
+            <a:round/>
+            <a:headEnd/>
+            <a:tailEnd type="triangle" w="med" len="med"/>
+          </a:ln>
+        </p:spPr>
+        <p:txBody>
+          <a:bodyPr/>
+          <a:lstStyle/>
+          <a:p>
+            <a:endParaRPr lang="en-US"/>
+          </a:p>
+        </p:txBody>
+      </p:sp>
+      <p:sp>
+        <p:nvSpPr>
+          <p:cNvPr id="11300" name="Line 71"/>
+          <p:cNvSpPr>
+            <a:spLocks noChangeShapeType="1"/>
+          </p:cNvSpPr>
+          <p:nvPr/>
+        </p:nvSpPr>
+        <p:spPr bwMode="auto">
+          <a:xfrm>
+            <a:off x="2051050" y="6324600"/>
+            <a:ext cx="2286000" cy="0"/>
+          </a:xfrm>
+          <a:prstGeom prst="line">
+            <a:avLst/>
+          </a:prstGeom>
+          <a:noFill/>
+          <a:ln w="9525">
+            <a:solidFill>
+              <a:schemeClr val="tx1"/>
+            </a:solidFill>
+            <a:round/>
+            <a:headEnd/>
+            <a:tailEnd type="triangle" w="med" len="med"/>
+          </a:ln>
+        </p:spPr>
+        <p:txBody>
+          <a:bodyPr/>
+          <a:lstStyle/>
+          <a:p>
+            <a:endParaRPr lang="en-US"/>
+          </a:p>
+        </p:txBody>
+      </p:sp>
+      <p:sp>
+        <p:nvSpPr>
+          <p:cNvPr id="11301" name="Text Box 72"/>
           <p:cNvSpPr txBox="1">
             <a:spLocks noChangeArrowheads="1"/>
           </p:cNvSpPr>
@@ -6480,8 +6513,8 @@
         </p:nvSpPr>
         <p:spPr bwMode="auto">
           <a:xfrm>
-            <a:off x="5068267" y="6019800"/>
-            <a:ext cx="1737975" cy="246221"/>
+            <a:off x="2623221" y="6096000"/>
+            <a:ext cx="1141659" cy="246221"/>
           </a:xfrm>
           <a:prstGeom prst="rect">
             <a:avLst/>
@@ -6502,8 +6535,12 @@
           <a:p>
             <a:pPr algn="ctr"/>
             <a:r>
+              <a:rPr lang="en-US" sz="1000" b="0" dirty="0"/>
+              <a:t>Post </a:t>
+            </a:r>
+            <a:r>
               <a:rPr lang="en-US" sz="1000" b="0" dirty="0" smtClean="0"/>
-              <a:t>Close Subscription Session</a:t>
+              <a:t>Publication</a:t>
             </a:r>
             <a:endParaRPr lang="en-US" sz="1000" b="0" dirty="0"/>
           </a:p>
@@ -6511,15 +6548,15 @@
       </p:sp>
       <p:sp>
         <p:nvSpPr>
-          <p:cNvPr id="11297" name="Line 68"/>
+          <p:cNvPr id="11302" name="Line 78"/>
           <p:cNvSpPr>
             <a:spLocks noChangeShapeType="1"/>
           </p:cNvSpPr>
           <p:nvPr/>
         </p:nvSpPr>
         <p:spPr bwMode="auto">
-          <a:xfrm flipH="1">
-            <a:off x="4794250" y="6248400"/>
+          <a:xfrm>
+            <a:off x="2051050" y="2743200"/>
             <a:ext cx="2286000" cy="0"/>
           </a:xfrm>
           <a:prstGeom prst="line">
@@ -6545,41 +6582,7 @@
       </p:sp>
       <p:sp>
         <p:nvSpPr>
-          <p:cNvPr id="11300" name="Line 71"/>
-          <p:cNvSpPr>
-            <a:spLocks noChangeShapeType="1"/>
-          </p:cNvSpPr>
-          <p:nvPr/>
-        </p:nvSpPr>
-        <p:spPr bwMode="auto">
-          <a:xfrm>
-            <a:off x="2051050" y="6324600"/>
-            <a:ext cx="2286000" cy="0"/>
-          </a:xfrm>
-          <a:prstGeom prst="line">
-            <a:avLst/>
-          </a:prstGeom>
-          <a:noFill/>
-          <a:ln w="9525">
-            <a:solidFill>
-              <a:schemeClr val="tx1"/>
-            </a:solidFill>
-            <a:round/>
-            <a:headEnd/>
-            <a:tailEnd type="triangle" w="med" len="med"/>
-          </a:ln>
-        </p:spPr>
-        <p:txBody>
-          <a:bodyPr/>
-          <a:lstStyle/>
-          <a:p>
-            <a:endParaRPr lang="en-US"/>
-          </a:p>
-        </p:txBody>
-      </p:sp>
-      <p:sp>
-        <p:nvSpPr>
-          <p:cNvPr id="11301" name="Text Box 72"/>
+          <p:cNvPr id="11303" name="Text Box 79"/>
           <p:cNvSpPr txBox="1">
             <a:spLocks noChangeArrowheads="1"/>
           </p:cNvSpPr>
@@ -6587,8 +6590,8 @@
         </p:nvSpPr>
         <p:spPr bwMode="auto">
           <a:xfrm>
-            <a:off x="2623221" y="6096000"/>
-            <a:ext cx="1141659" cy="246221"/>
+            <a:off x="2372351" y="2514600"/>
+            <a:ext cx="1643400" cy="246221"/>
           </a:xfrm>
           <a:prstGeom prst="rect">
             <a:avLst/>
@@ -6610,83 +6613,6 @@
             <a:pPr algn="ctr"/>
             <a:r>
               <a:rPr lang="en-US" sz="1000" b="0" dirty="0"/>
-              <a:t>Post </a:t>
-            </a:r>
-            <a:r>
-              <a:rPr lang="en-US" sz="1000" b="0" dirty="0" smtClean="0"/>
-              <a:t>Publication</a:t>
-            </a:r>
-            <a:endParaRPr lang="en-US" sz="1000" b="0" dirty="0"/>
-          </a:p>
-        </p:txBody>
-      </p:sp>
-      <p:sp>
-        <p:nvSpPr>
-          <p:cNvPr id="11302" name="Line 78"/>
-          <p:cNvSpPr>
-            <a:spLocks noChangeShapeType="1"/>
-          </p:cNvSpPr>
-          <p:nvPr/>
-        </p:nvSpPr>
-        <p:spPr bwMode="auto">
-          <a:xfrm>
-            <a:off x="2051050" y="2743200"/>
-            <a:ext cx="2286000" cy="0"/>
-          </a:xfrm>
-          <a:prstGeom prst="line">
-            <a:avLst/>
-          </a:prstGeom>
-          <a:noFill/>
-          <a:ln w="9525">
-            <a:solidFill>
-              <a:schemeClr val="tx1"/>
-            </a:solidFill>
-            <a:round/>
-            <a:headEnd/>
-            <a:tailEnd type="triangle" w="med" len="med"/>
-          </a:ln>
-        </p:spPr>
-        <p:txBody>
-          <a:bodyPr/>
-          <a:lstStyle/>
-          <a:p>
-            <a:endParaRPr lang="en-US"/>
-          </a:p>
-        </p:txBody>
-      </p:sp>
-      <p:sp>
-        <p:nvSpPr>
-          <p:cNvPr id="11303" name="Text Box 79"/>
-          <p:cNvSpPr txBox="1">
-            <a:spLocks noChangeArrowheads="1"/>
-          </p:cNvSpPr>
-          <p:nvPr/>
-        </p:nvSpPr>
-        <p:spPr bwMode="auto">
-          <a:xfrm>
-            <a:off x="2372351" y="2514600"/>
-            <a:ext cx="1643400" cy="246221"/>
-          </a:xfrm>
-          <a:prstGeom prst="rect">
-            <a:avLst/>
-          </a:prstGeom>
-          <a:noFill/>
-          <a:ln w="9525">
-            <a:noFill/>
-            <a:miter lim="800000"/>
-            <a:headEnd/>
-            <a:tailEnd/>
-          </a:ln>
-        </p:spPr>
-        <p:txBody>
-          <a:bodyPr wrap="none">
-            <a:spAutoFit/>
-          </a:bodyPr>
-          <a:lstStyle/>
-          <a:p>
-            <a:pPr algn="ctr"/>
-            <a:r>
-              <a:rPr lang="en-US" sz="1000" b="0" dirty="0"/>
               <a:t>Open Publication </a:t>
             </a:r>
             <a:r>
@@ -6694,41 +6620,6 @@
               <a:t>Session</a:t>
             </a:r>
             <a:endParaRPr lang="en-US" sz="1000" b="0" dirty="0"/>
-          </a:p>
-        </p:txBody>
-      </p:sp>
-      <p:sp>
-        <p:nvSpPr>
-          <p:cNvPr id="11308" name="Line 100"/>
-          <p:cNvSpPr>
-            <a:spLocks noChangeShapeType="1"/>
-          </p:cNvSpPr>
-          <p:nvPr/>
-        </p:nvSpPr>
-        <p:spPr bwMode="auto">
-          <a:xfrm>
-            <a:off x="4337050" y="3505200"/>
-            <a:ext cx="457200" cy="228600"/>
-          </a:xfrm>
-          <a:prstGeom prst="line">
-            <a:avLst/>
-          </a:prstGeom>
-          <a:noFill/>
-          <a:ln w="9525">
-            <a:solidFill>
-              <a:schemeClr val="bg2"/>
-            </a:solidFill>
-            <a:prstDash val="dashDot"/>
-            <a:round/>
-            <a:headEnd/>
-            <a:tailEnd type="triangle" w="med" len="med"/>
-          </a:ln>
-        </p:spPr>
-        <p:txBody>
-          <a:bodyPr/>
-          <a:lstStyle/>
-          <a:p>
-            <a:endParaRPr lang="en-US"/>
           </a:p>
         </p:txBody>
       </p:sp>
@@ -8132,7 +8023,6 @@
               <a:rPr lang="en-US" sz="1000" b="0" dirty="0"/>
               <a:t>Session</a:t>
             </a:r>
-            <a:endParaRPr lang="en-US" sz="1000" b="0" dirty="0"/>
           </a:p>
         </p:txBody>
       </p:sp>
@@ -11326,7 +11216,6 @@
               <a:rPr lang="en-US" b="0" dirty="0" smtClean="0"/>
               <a:t>Open Read Request Session</a:t>
             </a:r>
-            <a:endParaRPr lang="en-US" b="0" dirty="0" smtClean="0"/>
           </a:p>
           <a:p>
             <a:pPr>
@@ -11336,13 +11225,8 @@
             </a:pPr>
             <a:r>
               <a:rPr lang="en-US" b="0" dirty="0" smtClean="0"/>
-              <a:t>Notify </a:t>
-            </a:r>
-            <a:r>
-              <a:rPr lang="en-US" b="0" dirty="0" smtClean="0"/>
-              <a:t>Listener</a:t>
-            </a:r>
-            <a:endParaRPr lang="en-US" b="0" dirty="0" smtClean="0"/>
+              <a:t>Notify Listener</a:t>
+            </a:r>
           </a:p>
           <a:p>
             <a:pPr>
@@ -11388,7 +11272,6 @@
               <a:rPr lang="en-US" b="0" dirty="0" smtClean="0"/>
               <a:t>Open Post Response Session</a:t>
             </a:r>
-            <a:endParaRPr lang="en-US" b="0" dirty="0" smtClean="0"/>
           </a:p>
           <a:p>
             <a:pPr>
@@ -11563,13 +11446,8 @@
             </a:pPr>
             <a:r>
               <a:rPr lang="en-US" b="0" dirty="0" smtClean="0"/>
-              <a:t>Open </a:t>
-            </a:r>
-            <a:r>
-              <a:rPr lang="en-US" b="0" dirty="0" smtClean="0"/>
-              <a:t>Post Request Session</a:t>
-            </a:r>
-            <a:endParaRPr lang="en-US" b="0" dirty="0" smtClean="0"/>
+              <a:t>Open Post Request Session</a:t>
+            </a:r>
           </a:p>
           <a:p>
             <a:pPr algn="r">
@@ -11620,7 +11498,6 @@
               <a:rPr lang="en-US" b="0" dirty="0" smtClean="0"/>
               <a:t>Notify Listener</a:t>
             </a:r>
-            <a:endParaRPr lang="en-US" b="0" dirty="0" smtClean="0"/>
           </a:p>
           <a:p>
             <a:pPr algn="r">
@@ -12092,11 +11969,7 @@
             <a:pPr algn="ctr"/>
             <a:r>
               <a:rPr lang="en-US" sz="1000" b="0" dirty="0" smtClean="0"/>
-              <a:t>Open </a:t>
-            </a:r>
-            <a:r>
-              <a:rPr lang="en-US" sz="1000" b="0" dirty="0" smtClean="0"/>
-              <a:t>Post Request Session</a:t>
+              <a:t>Open Post Request Session</a:t>
             </a:r>
             <a:endParaRPr lang="en-US" sz="1000" b="0" dirty="0"/>
           </a:p>
@@ -12205,11 +12078,7 @@
             <a:pPr algn="ctr"/>
             <a:r>
               <a:rPr lang="en-US" sz="1000" b="0" dirty="0" smtClean="0"/>
-              <a:t>Close </a:t>
-            </a:r>
-            <a:r>
-              <a:rPr lang="en-US" sz="1000" b="0" dirty="0" smtClean="0"/>
-              <a:t>Post Request Session</a:t>
+              <a:t>Close Post Request Session</a:t>
             </a:r>
             <a:endParaRPr lang="en-US" sz="1000" b="0" dirty="0"/>
           </a:p>
@@ -13048,15 +12917,7 @@
             <a:pPr algn="ctr"/>
             <a:r>
               <a:rPr lang="en-US" sz="1000" b="0" dirty="0" smtClean="0"/>
-              <a:t>Ope</a:t>
-            </a:r>
-            <a:r>
-              <a:rPr lang="en-US" sz="1000" b="0" dirty="0" smtClean="0"/>
-              <a:t>n Read </a:t>
-            </a:r>
-            <a:r>
-              <a:rPr lang="en-US" sz="1000" b="0" dirty="0" smtClean="0"/>
-              <a:t>Response Session</a:t>
+              <a:t>Open Read Response Session</a:t>
             </a:r>
             <a:endParaRPr lang="en-US" sz="1000" b="0" dirty="0"/>
           </a:p>
@@ -13687,11 +13548,7 @@
             <a:pPr algn="ctr"/>
             <a:r>
               <a:rPr lang="en-US" sz="1000" b="0" dirty="0" smtClean="0"/>
-              <a:t>Open </a:t>
-            </a:r>
-            <a:r>
-              <a:rPr lang="en-US" sz="1000" b="0" dirty="0" smtClean="0"/>
-              <a:t>Post Request Session</a:t>
+              <a:t>Open Post Request Session</a:t>
             </a:r>
             <a:endParaRPr lang="en-US" sz="1000" b="0" dirty="0"/>
           </a:p>
@@ -13800,11 +13657,7 @@
             <a:pPr algn="ctr"/>
             <a:r>
               <a:rPr lang="en-US" sz="1000" b="0" dirty="0" smtClean="0"/>
-              <a:t>Close </a:t>
-            </a:r>
-            <a:r>
-              <a:rPr lang="en-US" sz="1000" b="0" dirty="0" smtClean="0"/>
-              <a:t>Post Request Session</a:t>
+              <a:t>Close Post Request Session</a:t>
             </a:r>
             <a:endParaRPr lang="en-US" sz="1000" b="0" dirty="0"/>
           </a:p>
@@ -15752,11 +15605,7 @@
             <a:pPr algn="ctr"/>
             <a:r>
               <a:rPr lang="en-US" sz="1000" b="0" dirty="0" smtClean="0"/>
-              <a:t>Open </a:t>
-            </a:r>
-            <a:r>
-              <a:rPr lang="en-US" sz="1000" b="0" dirty="0" smtClean="0"/>
-              <a:t>Post Request Session</a:t>
+              <a:t>Open Post Request Session</a:t>
             </a:r>
             <a:endParaRPr lang="en-US" sz="1000" b="0" dirty="0"/>
           </a:p>
@@ -15967,11 +15816,7 @@
             <a:pPr algn="ctr"/>
             <a:r>
               <a:rPr lang="en-US" sz="1000" b="0" dirty="0" smtClean="0"/>
-              <a:t>Read </a:t>
-            </a:r>
-            <a:r>
-              <a:rPr lang="en-US" sz="1000" b="0" dirty="0" smtClean="0"/>
-              <a:t>Response</a:t>
+              <a:t>Read Response</a:t>
             </a:r>
             <a:endParaRPr lang="en-US" sz="1000" b="0" dirty="0"/>
           </a:p>
@@ -16561,11 +16406,7 @@
             <a:pPr algn="ctr"/>
             <a:r>
               <a:rPr lang="en-US" sz="1000" b="0" dirty="0" smtClean="0"/>
-              <a:t>Read </a:t>
-            </a:r>
-            <a:r>
-              <a:rPr lang="en-US" sz="1000" b="0" dirty="0" smtClean="0"/>
-              <a:t>Response</a:t>
+              <a:t>Read Response</a:t>
             </a:r>
             <a:endParaRPr lang="en-US" sz="1000" b="0" dirty="0"/>
           </a:p>
@@ -16638,11 +16479,7 @@
             <a:pPr algn="ctr"/>
             <a:r>
               <a:rPr lang="en-US" sz="1000" b="0" dirty="0" smtClean="0"/>
-              <a:t>Read </a:t>
-            </a:r>
-            <a:r>
-              <a:rPr lang="en-US" sz="1000" b="0" dirty="0" smtClean="0"/>
-              <a:t>Response</a:t>
+              <a:t>Read Response</a:t>
             </a:r>
             <a:endParaRPr lang="en-US" sz="1000" b="0" dirty="0"/>
           </a:p>
@@ -16759,11 +16596,7 @@
             <a:pPr algn="ctr"/>
             <a:r>
               <a:rPr lang="en-US" sz="1000" b="0" dirty="0" smtClean="0"/>
-              <a:t>Close </a:t>
-            </a:r>
-            <a:r>
-              <a:rPr lang="en-US" sz="1000" b="0" dirty="0" smtClean="0"/>
-              <a:t>Post Request Session</a:t>
+              <a:t>Close Post Request Session</a:t>
             </a:r>
             <a:endParaRPr lang="en-US" sz="1000" b="0" dirty="0"/>
           </a:p>
@@ -17807,11 +17640,7 @@
             <a:pPr algn="ctr"/>
             <a:r>
               <a:rPr lang="en-US" sz="1000" b="0" dirty="0" smtClean="0"/>
-              <a:t>Open </a:t>
-            </a:r>
-            <a:r>
-              <a:rPr lang="en-US" sz="1000" b="0" dirty="0" smtClean="0"/>
-              <a:t>Subscription Session</a:t>
+              <a:t>Open Subscription Session</a:t>
             </a:r>
             <a:endParaRPr lang="en-US" sz="1000" b="0" dirty="0"/>
           </a:p>
@@ -26513,7 +26342,7 @@
         <p:spPr bwMode="auto">
           <a:xfrm>
             <a:off x="4724400" y="2057400"/>
-            <a:ext cx="3919538" cy="523875"/>
+            <a:ext cx="3610027" cy="523220"/>
           </a:xfrm>
           <a:prstGeom prst="rect">
             <a:avLst/>
@@ -26533,13 +26362,17 @@
           <a:lstStyle/>
           <a:p>
             <a:r>
-              <a:rPr lang="en-US" sz="1400" b="0"/>
-              <a:t>CIR, ISA 95.02, B2MML, MIMOSA, ISO 15926,</a:t>
-            </a:r>
-          </a:p>
-          <a:p>
-            <a:r>
-              <a:rPr lang="en-US" sz="1400" b="0"/>
+              <a:rPr lang="en-US" sz="1400" b="0" dirty="0" smtClean="0"/>
+              <a:t>ISA </a:t>
+            </a:r>
+            <a:r>
+              <a:rPr lang="en-US" sz="1400" b="0" dirty="0"/>
+              <a:t>95.02, B2MML, MIMOSA, ISO 15926,</a:t>
+            </a:r>
+          </a:p>
+          <a:p>
+            <a:r>
+              <a:rPr lang="en-US" sz="1400" b="0" dirty="0"/>
               <a:t>OPC UA Objects, OAGIS, OMAC…</a:t>
             </a:r>
           </a:p>
@@ -35951,7 +35784,7 @@
         <p:spPr bwMode="auto">
           <a:xfrm>
             <a:off x="942881" y="4038600"/>
-            <a:ext cx="3095719" cy="1754326"/>
+            <a:ext cx="2617127" cy="1754326"/>
           </a:xfrm>
           <a:prstGeom prst="rect">
             <a:avLst/>
@@ -35988,9 +35821,12 @@
             </a:pPr>
             <a:r>
               <a:rPr lang="en-US" b="0" dirty="0" smtClean="0"/>
-              <a:t>Create Channel Namespace</a:t>
-            </a:r>
-            <a:endParaRPr lang="en-US" b="0" dirty="0"/>
+              <a:t>Create </a:t>
+            </a:r>
+            <a:r>
+              <a:rPr lang="en-US" b="0" dirty="0" smtClean="0"/>
+              <a:t>Topic</a:t>
+            </a:r>
           </a:p>
           <a:p>
             <a:pPr>
@@ -36000,11 +35836,7 @@
             </a:pPr>
             <a:r>
               <a:rPr lang="en-US" b="0" dirty="0" smtClean="0"/>
-              <a:t>Create </a:t>
-            </a:r>
-            <a:r>
-              <a:rPr lang="en-US" b="0" dirty="0"/>
-              <a:t>Topic</a:t>
+              <a:t>Add Security Token</a:t>
             </a:r>
           </a:p>
           <a:p>
@@ -36014,9 +35846,10 @@
               </a:tabLst>
             </a:pPr>
             <a:r>
-              <a:rPr lang="en-US" b="0" dirty="0"/>
-              <a:t>Delete Channel </a:t>
-            </a:r>
+              <a:rPr lang="en-US" b="0" dirty="0" smtClean="0"/>
+              <a:t>Remove Security Token</a:t>
+            </a:r>
+            <a:endParaRPr lang="en-US" b="0" dirty="0"/>
           </a:p>
           <a:p>
             <a:pPr>
@@ -36025,12 +35858,8 @@
               </a:tabLst>
             </a:pPr>
             <a:r>
-              <a:rPr lang="en-US" b="0" dirty="0" smtClean="0"/>
-              <a:t>Delete </a:t>
-            </a:r>
-            <a:r>
               <a:rPr lang="en-US" b="0" dirty="0"/>
-              <a:t>Channel Namespace</a:t>
+              <a:t>Delete Channel </a:t>
             </a:r>
           </a:p>
           <a:p>
@@ -36040,12 +35869,8 @@
               </a:tabLst>
             </a:pPr>
             <a:r>
-              <a:rPr lang="en-US" b="0" dirty="0"/>
-              <a:t>Delete </a:t>
-            </a:r>
-            <a:r>
               <a:rPr lang="en-US" b="0" dirty="0" smtClean="0"/>
-              <a:t>Topic</a:t>
+              <a:t>Delete Topic</a:t>
             </a:r>
             <a:endParaRPr lang="en-US" b="0" dirty="0"/>
           </a:p>
@@ -36128,43 +35953,6 @@
       </p:cxnSp>
       <p:sp>
         <p:nvSpPr>
-          <p:cNvPr id="9231" name="TextBox 14"/>
-          <p:cNvSpPr txBox="1">
-            <a:spLocks noChangeArrowheads="1"/>
-          </p:cNvSpPr>
-          <p:nvPr/>
-        </p:nvSpPr>
-        <p:spPr bwMode="auto">
-          <a:xfrm>
-            <a:off x="2590800" y="3200400"/>
-            <a:ext cx="1295400" cy="261610"/>
-          </a:xfrm>
-          <a:prstGeom prst="rect">
-            <a:avLst/>
-          </a:prstGeom>
-          <a:noFill/>
-          <a:ln w="9525">
-            <a:noFill/>
-            <a:miter lim="800000"/>
-            <a:headEnd/>
-            <a:tailEnd/>
-          </a:ln>
-        </p:spPr>
-        <p:txBody>
-          <a:bodyPr>
-            <a:spAutoFit/>
-          </a:bodyPr>
-          <a:lstStyle/>
-          <a:p>
-            <a:r>
-              <a:rPr lang="en-US" sz="1100" b="0" dirty="0"/>
-              <a:t>Channel sessions </a:t>
-            </a:r>
-          </a:p>
-        </p:txBody>
-      </p:sp>
-      <p:sp>
-        <p:nvSpPr>
           <p:cNvPr id="9232" name="Text Box 12"/>
           <p:cNvSpPr txBox="1">
             <a:spLocks noChangeArrowheads="1"/>
@@ -36233,7 +36021,6 @@
               <a:rPr lang="en-US" b="0" dirty="0" smtClean="0"/>
               <a:t>Session</a:t>
             </a:r>
-            <a:endParaRPr lang="en-US" b="0" dirty="0" smtClean="0"/>
           </a:p>
           <a:p>
             <a:pPr algn="r">
@@ -36261,7 +36048,6 @@
               <a:rPr lang="en-US" b="0" dirty="0" smtClean="0"/>
               <a:t>Topic</a:t>
             </a:r>
-            <a:endParaRPr lang="en-US" b="0" dirty="0" smtClean="0"/>
           </a:p>
           <a:p>
             <a:pPr algn="r">
@@ -36274,43 +36060,6 @@
               <a:t>Get Topics</a:t>
             </a:r>
             <a:endParaRPr lang="en-US" b="0" dirty="0"/>
-          </a:p>
-        </p:txBody>
-      </p:sp>
-      <p:sp>
-        <p:nvSpPr>
-          <p:cNvPr id="9233" name="TextBox 16"/>
-          <p:cNvSpPr txBox="1">
-            <a:spLocks noChangeArrowheads="1"/>
-          </p:cNvSpPr>
-          <p:nvPr/>
-        </p:nvSpPr>
-        <p:spPr bwMode="auto">
-          <a:xfrm>
-            <a:off x="5105400" y="3429000"/>
-            <a:ext cx="1295400" cy="261610"/>
-          </a:xfrm>
-          <a:prstGeom prst="rect">
-            <a:avLst/>
-          </a:prstGeom>
-          <a:noFill/>
-          <a:ln w="9525">
-            <a:noFill/>
-            <a:miter lim="800000"/>
-            <a:headEnd/>
-            <a:tailEnd/>
-          </a:ln>
-        </p:spPr>
-        <p:txBody>
-          <a:bodyPr>
-            <a:spAutoFit/>
-          </a:bodyPr>
-          <a:lstStyle/>
-          <a:p>
-            <a:r>
-              <a:rPr lang="en-US" sz="1100" b="0"/>
-              <a:t>Channel sessions </a:t>
-            </a:r>
           </a:p>
         </p:txBody>
       </p:sp>
@@ -36737,7 +36486,7 @@
         <p:spPr bwMode="auto">
           <a:xfrm>
             <a:off x="914400" y="4038600"/>
-            <a:ext cx="2890535" cy="923330"/>
+            <a:ext cx="2852063" cy="1200329"/>
           </a:xfrm>
           <a:prstGeom prst="rect">
             <a:avLst/>
@@ -36779,8 +36528,24 @@
             </a:pPr>
             <a:r>
               <a:rPr lang="en-US" b="0" dirty="0"/>
-              <a:t>Post Publication</a:t>
-            </a:r>
+              <a:t>Post </a:t>
+            </a:r>
+            <a:r>
+              <a:rPr lang="en-US" b="0" dirty="0" smtClean="0"/>
+              <a:t>Publication</a:t>
+            </a:r>
+          </a:p>
+          <a:p>
+            <a:pPr>
+              <a:tabLst>
+                <a:tab pos="228600" algn="l"/>
+              </a:tabLst>
+            </a:pPr>
+            <a:r>
+              <a:rPr lang="en-US" b="0" dirty="0" smtClean="0"/>
+              <a:t>Expire Publication</a:t>
+            </a:r>
+            <a:endParaRPr lang="en-US" b="0" dirty="0"/>
           </a:p>
           <a:p>
             <a:pPr>

</xml_diff>

<commit_message>
Indicated that security tokens can be of any format and extracted WS-Security token format section for later revision Reworded Post Response behaviour to indicate that no action is taken if the ISBM service provider cannot find a request message with the given ID Add behaviour to Read Publication if LastMessageID doesn’t correspond to a message then a fault is thrown Reworded Close Publication Session behaviour to indicate that all messages posted during the session are expired Removed CreateTopic, DeleteTopic and GetTopic Added RequestMessageID parameter for RemoveResponse Made ChannelDescription mandatory (otherwise we get problems when using xs:any for security tokens)
</commit_message>
<xml_diff>
--- a/0-Doc/OpenO&M Information Service Bus Model Specification Diagrams.pptx
+++ b/0-Doc/OpenO&M Information Service Bus Model Specification Diagrams.pptx
@@ -5677,11 +5677,7 @@
             </a:pPr>
             <a:r>
               <a:rPr lang="en-US" b="0" dirty="0" smtClean="0"/>
-              <a:t>Open </a:t>
-            </a:r>
-            <a:r>
-              <a:rPr lang="en-US" b="0" dirty="0" smtClean="0"/>
-              <a:t>Read Request Session</a:t>
+              <a:t>Open Read Request Session</a:t>
             </a:r>
           </a:p>
           <a:p>
@@ -5692,11 +5688,7 @@
             </a:pPr>
             <a:r>
               <a:rPr lang="en-US" b="0" dirty="0" smtClean="0"/>
-              <a:t>Read </a:t>
-            </a:r>
-            <a:r>
-              <a:rPr lang="en-US" b="0" dirty="0" smtClean="0"/>
-              <a:t>Request</a:t>
+              <a:t>Read Request</a:t>
             </a:r>
           </a:p>
           <a:p>
@@ -5906,11 +5898,7 @@
             </a:pPr>
             <a:r>
               <a:rPr lang="en-US" b="0" dirty="0" smtClean="0"/>
-              <a:t>Open </a:t>
-            </a:r>
-            <a:r>
-              <a:rPr lang="en-US" b="0" dirty="0" smtClean="0"/>
-              <a:t>Post Request Session</a:t>
+              <a:t>Open Post Request Session</a:t>
             </a:r>
           </a:p>
           <a:p>
@@ -5960,11 +5948,7 @@
             </a:pPr>
             <a:r>
               <a:rPr lang="en-US" b="0" dirty="0" smtClean="0"/>
-              <a:t>Read </a:t>
-            </a:r>
-            <a:r>
-              <a:rPr lang="en-US" b="0" dirty="0" smtClean="0"/>
-              <a:t>Response</a:t>
+              <a:t>Read Response</a:t>
             </a:r>
           </a:p>
           <a:p>
@@ -23403,7 +23387,7 @@
         <p:spPr bwMode="auto">
           <a:xfrm>
             <a:off x="942881" y="4038600"/>
-            <a:ext cx="2732543" cy="1754326"/>
+            <a:ext cx="2732543" cy="1200329"/>
           </a:xfrm>
           <a:prstGeom prst="rect">
             <a:avLst/>
@@ -23440,7 +23424,11 @@
             </a:pPr>
             <a:r>
               <a:rPr lang="en-US" b="0" dirty="0" smtClean="0"/>
-              <a:t>Create Topic</a:t>
+              <a:t>Add </a:t>
+            </a:r>
+            <a:r>
+              <a:rPr lang="en-US" b="0" dirty="0" smtClean="0"/>
+              <a:t>Security Tokens</a:t>
             </a:r>
           </a:p>
           <a:p>
@@ -23451,13 +23439,9 @@
             </a:pPr>
             <a:r>
               <a:rPr lang="en-US" b="0" dirty="0" smtClean="0"/>
-              <a:t>Add Security </a:t>
-            </a:r>
-            <a:r>
-              <a:rPr lang="en-US" b="0" dirty="0" smtClean="0"/>
-              <a:t>Tokens</a:t>
-            </a:r>
-            <a:endParaRPr lang="en-US" b="0" dirty="0" smtClean="0"/>
+              <a:t>Remove Security Tokens</a:t>
+            </a:r>
+            <a:endParaRPr lang="en-US" b="0" dirty="0"/>
           </a:p>
           <a:p>
             <a:pPr>
@@ -23466,37 +23450,9 @@
               </a:tabLst>
             </a:pPr>
             <a:r>
-              <a:rPr lang="en-US" b="0" dirty="0" smtClean="0"/>
-              <a:t>Remove Security </a:t>
-            </a:r>
-            <a:r>
-              <a:rPr lang="en-US" b="0" dirty="0" smtClean="0"/>
-              <a:t>Tokens</a:t>
-            </a:r>
-            <a:endParaRPr lang="en-US" b="0" dirty="0"/>
-          </a:p>
-          <a:p>
-            <a:pPr>
-              <a:tabLst>
-                <a:tab pos="228600" algn="l"/>
-              </a:tabLst>
-            </a:pPr>
-            <a:r>
               <a:rPr lang="en-US" b="0" dirty="0"/>
               <a:t>Delete Channel </a:t>
             </a:r>
-          </a:p>
-          <a:p>
-            <a:pPr>
-              <a:tabLst>
-                <a:tab pos="228600" algn="l"/>
-              </a:tabLst>
-            </a:pPr>
-            <a:r>
-              <a:rPr lang="en-US" b="0" dirty="0" smtClean="0"/>
-              <a:t>Delete Topic</a:t>
-            </a:r>
-            <a:endParaRPr lang="en-US" b="0" dirty="0"/>
           </a:p>
         </p:txBody>
       </p:sp>
@@ -23586,7 +23542,7 @@
         <p:spPr bwMode="auto">
           <a:xfrm>
             <a:off x="6405691" y="4038600"/>
-            <a:ext cx="1595309" cy="923330"/>
+            <a:ext cx="1595309" cy="646331"/>
           </a:xfrm>
           <a:prstGeom prst="rect">
             <a:avLst/>
@@ -23628,24 +23584,13 @@
             </a:pPr>
             <a:r>
               <a:rPr lang="en-US" b="0" dirty="0" smtClean="0"/>
-              <a:t>Get Channels</a:t>
-            </a:r>
-          </a:p>
-          <a:p>
-            <a:pPr algn="r">
-              <a:tabLst>
-                <a:tab pos="228600" algn="l"/>
-              </a:tabLst>
-            </a:pPr>
+              <a:t>Get </a:t>
+            </a:r>
             <a:r>
               <a:rPr lang="en-US" b="0" dirty="0" smtClean="0"/>
-              <a:t>Get </a:t>
-            </a:r>
-            <a:r>
-              <a:rPr lang="en-US" b="0" dirty="0" smtClean="0"/>
-              <a:t>Topics</a:t>
-            </a:r>
-            <a:endParaRPr lang="en-US" b="0" dirty="0"/>
+              <a:t>Channels</a:t>
+            </a:r>
+            <a:endParaRPr lang="en-US" b="0" dirty="0" smtClean="0"/>
           </a:p>
         </p:txBody>
       </p:sp>
@@ -24300,11 +24245,7 @@
             </a:pPr>
             <a:r>
               <a:rPr lang="en-US" b="0" dirty="0" smtClean="0"/>
-              <a:t>Open </a:t>
-            </a:r>
-            <a:r>
-              <a:rPr lang="en-US" b="0" dirty="0" smtClean="0"/>
-              <a:t>Subscription Session</a:t>
+              <a:t>Open Subscription Session</a:t>
             </a:r>
             <a:endParaRPr lang="en-US" b="0" dirty="0"/>
           </a:p>
@@ -24316,11 +24257,7 @@
             </a:pPr>
             <a:r>
               <a:rPr lang="en-US" b="0" dirty="0" smtClean="0"/>
-              <a:t>Read </a:t>
-            </a:r>
-            <a:r>
-              <a:rPr lang="en-US" b="0" dirty="0" smtClean="0"/>
-              <a:t>Publication</a:t>
+              <a:t>Read Publication</a:t>
             </a:r>
             <a:endParaRPr lang="en-US" b="0" dirty="0"/>
           </a:p>
@@ -24332,11 +24269,7 @@
             </a:pPr>
             <a:r>
               <a:rPr lang="en-US" b="0" dirty="0" smtClean="0"/>
-              <a:t>Close </a:t>
-            </a:r>
-            <a:r>
-              <a:rPr lang="en-US" b="0" dirty="0" smtClean="0"/>
-              <a:t>Subscription Session</a:t>
+              <a:t>Close Subscription Session</a:t>
             </a:r>
             <a:endParaRPr lang="en-US" b="0" dirty="0"/>
           </a:p>

</xml_diff>

<commit_message>
Use AuthorizationToken element in header and rework request-response sessions
</commit_message>
<xml_diff>
--- a/0-Doc/OpenO&M Information Service Bus Model Specification Diagrams.pptx
+++ b/0-Doc/OpenO&M Information Service Bus Model Specification Diagrams.pptx
@@ -5651,7 +5651,7 @@
         <p:spPr bwMode="auto">
           <a:xfrm>
             <a:off x="914400" y="4038600"/>
-            <a:ext cx="3288080" cy="2031325"/>
+            <a:ext cx="3506088" cy="1477328"/>
           </a:xfrm>
           <a:prstGeom prst="rect">
             <a:avLst/>
@@ -5677,7 +5677,15 @@
             </a:pPr>
             <a:r>
               <a:rPr lang="en-US" b="0" dirty="0" smtClean="0"/>
-              <a:t>Open Read Request Session</a:t>
+              <a:t>Open </a:t>
+            </a:r>
+            <a:r>
+              <a:rPr lang="en-US" b="0" dirty="0" smtClean="0"/>
+              <a:t>Provider Request </a:t>
+            </a:r>
+            <a:r>
+              <a:rPr lang="en-US" b="0" dirty="0" smtClean="0"/>
+              <a:t>Session</a:t>
             </a:r>
           </a:p>
           <a:p>
@@ -5710,9 +5718,12 @@
             </a:pPr>
             <a:r>
               <a:rPr lang="en-US" b="0" dirty="0" smtClean="0"/>
-              <a:t>Close Read Request Session</a:t>
-            </a:r>
-            <a:endParaRPr lang="en-US" b="0" dirty="0"/>
+              <a:t>Post </a:t>
+            </a:r>
+            <a:r>
+              <a:rPr lang="en-US" b="0" dirty="0" smtClean="0"/>
+              <a:t>Response</a:t>
+            </a:r>
           </a:p>
           <a:p>
             <a:pPr>
@@ -5722,30 +5733,13 @@
             </a:pPr>
             <a:r>
               <a:rPr lang="en-US" b="0" dirty="0" smtClean="0"/>
-              <a:t>Open Post Response Session</a:t>
-            </a:r>
-          </a:p>
-          <a:p>
-            <a:pPr>
-              <a:tabLst>
-                <a:tab pos="228600" algn="l"/>
-              </a:tabLst>
-            </a:pPr>
-            <a:r>
-              <a:rPr lang="en-US" b="0" dirty="0" smtClean="0"/>
-              <a:t>Post Response</a:t>
-            </a:r>
-          </a:p>
-          <a:p>
-            <a:pPr>
-              <a:tabLst>
-                <a:tab pos="228600" algn="l"/>
-              </a:tabLst>
-            </a:pPr>
-            <a:r>
-              <a:rPr lang="en-US" b="0" dirty="0" smtClean="0"/>
-              <a:t>Close Post Response Session</a:t>
-            </a:r>
+              <a:t>Close </a:t>
+            </a:r>
+            <a:r>
+              <a:rPr lang="en-US" b="0" dirty="0"/>
+              <a:t>Provider Request Session</a:t>
+            </a:r>
+            <a:endParaRPr lang="en-US" b="0" dirty="0" smtClean="0"/>
           </a:p>
         </p:txBody>
       </p:sp>
@@ -5871,8 +5865,8 @@
         </p:nvSpPr>
         <p:spPr bwMode="auto">
           <a:xfrm>
-            <a:off x="4623152" y="4038600"/>
-            <a:ext cx="3377848" cy="2031325"/>
+            <a:off x="4315376" y="4038600"/>
+            <a:ext cx="3685624" cy="1477328"/>
           </a:xfrm>
           <a:prstGeom prst="rect">
             <a:avLst/>
@@ -5898,7 +5892,15 @@
             </a:pPr>
             <a:r>
               <a:rPr lang="en-US" b="0" dirty="0" smtClean="0"/>
-              <a:t>Open Post Request Session</a:t>
+              <a:t>Open </a:t>
+            </a:r>
+            <a:r>
+              <a:rPr lang="en-US" b="0" dirty="0" smtClean="0"/>
+              <a:t>Consumer Request </a:t>
+            </a:r>
+            <a:r>
+              <a:rPr lang="en-US" b="0" dirty="0" smtClean="0"/>
+              <a:t>Session</a:t>
             </a:r>
           </a:p>
           <a:p>
@@ -5919,14 +5921,13 @@
               </a:tabLst>
             </a:pPr>
             <a:r>
-              <a:rPr lang="en-US" b="0" dirty="0"/>
-              <a:t>Close </a:t>
-            </a:r>
-            <a:r>
               <a:rPr lang="en-US" b="0" dirty="0" smtClean="0"/>
-              <a:t>Post Request Session</a:t>
-            </a:r>
-            <a:endParaRPr lang="en-US" b="0" dirty="0"/>
+              <a:t>Read </a:t>
+            </a:r>
+            <a:r>
+              <a:rPr lang="en-US" b="0" dirty="0" smtClean="0"/>
+              <a:t>Response</a:t>
+            </a:r>
           </a:p>
           <a:p>
             <a:pPr algn="r">
@@ -5936,7 +5937,7 @@
             </a:pPr>
             <a:r>
               <a:rPr lang="en-US" b="0" dirty="0" smtClean="0"/>
-              <a:t>Open Read Response Session</a:t>
+              <a:t>Remove Response</a:t>
             </a:r>
             <a:endParaRPr lang="en-US" b="0" dirty="0"/>
           </a:p>
@@ -5948,31 +5949,13 @@
             </a:pPr>
             <a:r>
               <a:rPr lang="en-US" b="0" dirty="0" smtClean="0"/>
-              <a:t>Read Response</a:t>
-            </a:r>
-          </a:p>
-          <a:p>
-            <a:pPr algn="r">
-              <a:tabLst>
-                <a:tab pos="228600" algn="l"/>
-              </a:tabLst>
-            </a:pPr>
-            <a:r>
-              <a:rPr lang="en-US" b="0" dirty="0" smtClean="0"/>
-              <a:t>Remove Response</a:t>
-            </a:r>
-            <a:endParaRPr lang="en-US" b="0" dirty="0"/>
-          </a:p>
-          <a:p>
-            <a:pPr algn="r">
-              <a:tabLst>
-                <a:tab pos="228600" algn="l"/>
-              </a:tabLst>
-            </a:pPr>
-            <a:r>
-              <a:rPr lang="en-US" b="0" dirty="0" smtClean="0"/>
-              <a:t>Close Read Response Session</a:t>
-            </a:r>
+              <a:t>Close </a:t>
+            </a:r>
+            <a:r>
+              <a:rPr lang="en-US" b="0" dirty="0"/>
+              <a:t>Consumer Request Session</a:t>
+            </a:r>
+            <a:endParaRPr lang="en-US" b="0" dirty="0" smtClean="0"/>
           </a:p>
         </p:txBody>
       </p:sp>
@@ -23424,11 +23407,7 @@
             </a:pPr>
             <a:r>
               <a:rPr lang="en-US" b="0" dirty="0" smtClean="0"/>
-              <a:t>Add </a:t>
-            </a:r>
-            <a:r>
-              <a:rPr lang="en-US" b="0" dirty="0" smtClean="0"/>
-              <a:t>Security Tokens</a:t>
+              <a:t>Add Security Tokens</a:t>
             </a:r>
           </a:p>
           <a:p>
@@ -23584,13 +23563,8 @@
             </a:pPr>
             <a:r>
               <a:rPr lang="en-US" b="0" dirty="0" smtClean="0"/>
-              <a:t>Get </a:t>
-            </a:r>
-            <a:r>
-              <a:rPr lang="en-US" b="0" dirty="0" smtClean="0"/>
-              <a:t>Channels</a:t>
-            </a:r>
-            <a:endParaRPr lang="en-US" b="0" dirty="0" smtClean="0"/>
+              <a:t>Get Channels</a:t>
+            </a:r>
           </a:p>
         </p:txBody>
       </p:sp>

</xml_diff>